<commit_message>
Update Technical Presentation - Java Lagged.pptx
</commit_message>
<xml_diff>
--- a/Technical Presentation/Technical Presentation - Java Lagged.pptx
+++ b/Technical Presentation/Technical Presentation - Java Lagged.pptx
@@ -10101,6 +10101,36 @@
           </a:p>
         </p:txBody>
       </p:sp>
+      <p:pic>
+        <p:nvPicPr>
+          <p:cNvPr id="3" name="Picture 2"/>
+          <p:cNvPicPr>
+            <a:picLocks noChangeAspect="1"/>
+          </p:cNvPicPr>
+          <p:nvPr/>
+        </p:nvPicPr>
+        <p:blipFill>
+          <a:blip r:embed="rId2">
+            <a:extLst>
+              <a:ext uri="{28A0092B-C50C-407E-A947-70E740481C1C}">
+                <a14:useLocalDpi xmlns:a14="http://schemas.microsoft.com/office/drawing/2010/main" val="0"/>
+              </a:ext>
+            </a:extLst>
+          </a:blip>
+          <a:stretch>
+            <a:fillRect/>
+          </a:stretch>
+        </p:blipFill>
+        <p:spPr>
+          <a:xfrm>
+            <a:off x="677334" y="1930400"/>
+            <a:ext cx="5765800" cy="3517900"/>
+          </a:xfrm>
+          <a:prstGeom prst="rect">
+            <a:avLst/>
+          </a:prstGeom>
+        </p:spPr>
+      </p:pic>
     </p:spTree>
     <p:extLst>
       <p:ext uri="{BB962C8B-B14F-4D97-AF65-F5344CB8AC3E}">
@@ -10154,6 +10184,36 @@
           </a:p>
         </p:txBody>
       </p:sp>
+      <p:pic>
+        <p:nvPicPr>
+          <p:cNvPr id="3" name="Picture 2"/>
+          <p:cNvPicPr>
+            <a:picLocks noChangeAspect="1"/>
+          </p:cNvPicPr>
+          <p:nvPr/>
+        </p:nvPicPr>
+        <p:blipFill>
+          <a:blip r:embed="rId2">
+            <a:extLst>
+              <a:ext uri="{28A0092B-C50C-407E-A947-70E740481C1C}">
+                <a14:useLocalDpi xmlns:a14="http://schemas.microsoft.com/office/drawing/2010/main" val="0"/>
+              </a:ext>
+            </a:extLst>
+          </a:blip>
+          <a:stretch>
+            <a:fillRect/>
+          </a:stretch>
+        </p:blipFill>
+        <p:spPr>
+          <a:xfrm>
+            <a:off x="677334" y="1270000"/>
+            <a:ext cx="5626587" cy="5104640"/>
+          </a:xfrm>
+          <a:prstGeom prst="rect">
+            <a:avLst/>
+          </a:prstGeom>
+        </p:spPr>
+      </p:pic>
     </p:spTree>
     <p:extLst>
       <p:ext uri="{BB962C8B-B14F-4D97-AF65-F5344CB8AC3E}">
@@ -10207,6 +10267,36 @@
           </a:p>
         </p:txBody>
       </p:sp>
+      <p:pic>
+        <p:nvPicPr>
+          <p:cNvPr id="4" name="Picture 3"/>
+          <p:cNvPicPr>
+            <a:picLocks noChangeAspect="1"/>
+          </p:cNvPicPr>
+          <p:nvPr/>
+        </p:nvPicPr>
+        <p:blipFill>
+          <a:blip r:embed="rId2">
+            <a:extLst>
+              <a:ext uri="{28A0092B-C50C-407E-A947-70E740481C1C}">
+                <a14:useLocalDpi xmlns:a14="http://schemas.microsoft.com/office/drawing/2010/main" val="0"/>
+              </a:ext>
+            </a:extLst>
+          </a:blip>
+          <a:stretch>
+            <a:fillRect/>
+          </a:stretch>
+        </p:blipFill>
+        <p:spPr>
+          <a:xfrm>
+            <a:off x="677334" y="2099732"/>
+            <a:ext cx="10802423" cy="2777067"/>
+          </a:xfrm>
+          <a:prstGeom prst="rect">
+            <a:avLst/>
+          </a:prstGeom>
+        </p:spPr>
+      </p:pic>
     </p:spTree>
     <p:extLst>
       <p:ext uri="{BB962C8B-B14F-4D97-AF65-F5344CB8AC3E}">
@@ -10260,6 +10350,357 @@
             <a:r>
               <a:rPr lang="en-US" dirty="0" smtClean="0"/>
               <a:t>Known Bugs/Problems</a:t>
+            </a:r>
+            <a:endParaRPr lang="en-US" dirty="0"/>
+          </a:p>
+        </p:txBody>
+      </p:sp>
+      <p:sp>
+        <p:nvSpPr>
+          <p:cNvPr id="3" name="Content Placeholder 2"/>
+          <p:cNvSpPr txBox="1">
+            <a:spLocks/>
+          </p:cNvSpPr>
+          <p:nvPr/>
+        </p:nvSpPr>
+        <p:spPr>
+          <a:xfrm>
+            <a:off x="287866" y="1540933"/>
+            <a:ext cx="10464800" cy="5317067"/>
+          </a:xfrm>
+          <a:prstGeom prst="rect">
+            <a:avLst/>
+          </a:prstGeom>
+        </p:spPr>
+        <p:txBody>
+          <a:bodyPr/>
+          <a:lstStyle>
+            <a:lvl1pPr marL="342900" indent="-342900" algn="l" defTabSz="457200" rtl="0" eaLnBrk="1" latinLnBrk="0" hangingPunct="1">
+              <a:spcBef>
+                <a:spcPts val="1000"/>
+              </a:spcBef>
+              <a:spcAft>
+                <a:spcPts val="0"/>
+              </a:spcAft>
+              <a:buClr>
+                <a:schemeClr val="accent1"/>
+              </a:buClr>
+              <a:buSzPct val="80000"/>
+              <a:buFont typeface="Wingdings 3" charset="2"/>
+              <a:buChar char=""/>
+              <a:defRPr sz="1800" kern="1200">
+                <a:solidFill>
+                  <a:schemeClr val="tx1">
+                    <a:lumMod val="75000"/>
+                    <a:lumOff val="25000"/>
+                  </a:schemeClr>
+                </a:solidFill>
+                <a:latin typeface="+mn-lt"/>
+                <a:ea typeface="+mn-ea"/>
+                <a:cs typeface="+mn-cs"/>
+              </a:defRPr>
+            </a:lvl1pPr>
+            <a:lvl2pPr marL="742950" indent="-285750" algn="l" defTabSz="457200" rtl="0" eaLnBrk="1" latinLnBrk="0" hangingPunct="1">
+              <a:spcBef>
+                <a:spcPts val="1000"/>
+              </a:spcBef>
+              <a:spcAft>
+                <a:spcPts val="0"/>
+              </a:spcAft>
+              <a:buClr>
+                <a:schemeClr val="accent1"/>
+              </a:buClr>
+              <a:buSzPct val="80000"/>
+              <a:buFont typeface="Wingdings 3" charset="2"/>
+              <a:buChar char=""/>
+              <a:defRPr sz="1600" kern="1200">
+                <a:solidFill>
+                  <a:schemeClr val="tx1">
+                    <a:lumMod val="75000"/>
+                    <a:lumOff val="25000"/>
+                  </a:schemeClr>
+                </a:solidFill>
+                <a:latin typeface="+mn-lt"/>
+                <a:ea typeface="+mn-ea"/>
+                <a:cs typeface="+mn-cs"/>
+              </a:defRPr>
+            </a:lvl2pPr>
+            <a:lvl3pPr marL="1143000" indent="-228600" algn="l" defTabSz="457200" rtl="0" eaLnBrk="1" latinLnBrk="0" hangingPunct="1">
+              <a:spcBef>
+                <a:spcPts val="1000"/>
+              </a:spcBef>
+              <a:spcAft>
+                <a:spcPts val="0"/>
+              </a:spcAft>
+              <a:buClr>
+                <a:schemeClr val="accent1"/>
+              </a:buClr>
+              <a:buSzPct val="80000"/>
+              <a:buFont typeface="Wingdings 3" charset="2"/>
+              <a:buChar char=""/>
+              <a:defRPr sz="1400" kern="1200">
+                <a:solidFill>
+                  <a:schemeClr val="tx1">
+                    <a:lumMod val="75000"/>
+                    <a:lumOff val="25000"/>
+                  </a:schemeClr>
+                </a:solidFill>
+                <a:latin typeface="+mn-lt"/>
+                <a:ea typeface="+mn-ea"/>
+                <a:cs typeface="+mn-cs"/>
+              </a:defRPr>
+            </a:lvl3pPr>
+            <a:lvl4pPr marL="1600200" indent="-228600" algn="l" defTabSz="457200" rtl="0" eaLnBrk="1" latinLnBrk="0" hangingPunct="1">
+              <a:spcBef>
+                <a:spcPts val="1000"/>
+              </a:spcBef>
+              <a:spcAft>
+                <a:spcPts val="0"/>
+              </a:spcAft>
+              <a:buClr>
+                <a:schemeClr val="accent1"/>
+              </a:buClr>
+              <a:buSzPct val="80000"/>
+              <a:buFont typeface="Wingdings 3" charset="2"/>
+              <a:buChar char=""/>
+              <a:defRPr sz="1200" kern="1200">
+                <a:solidFill>
+                  <a:schemeClr val="tx1">
+                    <a:lumMod val="75000"/>
+                    <a:lumOff val="25000"/>
+                  </a:schemeClr>
+                </a:solidFill>
+                <a:latin typeface="+mn-lt"/>
+                <a:ea typeface="+mn-ea"/>
+                <a:cs typeface="+mn-cs"/>
+              </a:defRPr>
+            </a:lvl4pPr>
+            <a:lvl5pPr marL="2057400" indent="-228600" algn="l" defTabSz="457200" rtl="0" eaLnBrk="1" latinLnBrk="0" hangingPunct="1">
+              <a:spcBef>
+                <a:spcPts val="1000"/>
+              </a:spcBef>
+              <a:spcAft>
+                <a:spcPts val="0"/>
+              </a:spcAft>
+              <a:buClr>
+                <a:schemeClr val="accent1"/>
+              </a:buClr>
+              <a:buSzPct val="80000"/>
+              <a:buFont typeface="Wingdings 3" charset="2"/>
+              <a:buChar char=""/>
+              <a:defRPr sz="1200" kern="1200">
+                <a:solidFill>
+                  <a:schemeClr val="tx1">
+                    <a:lumMod val="75000"/>
+                    <a:lumOff val="25000"/>
+                  </a:schemeClr>
+                </a:solidFill>
+                <a:latin typeface="+mn-lt"/>
+                <a:ea typeface="+mn-ea"/>
+                <a:cs typeface="+mn-cs"/>
+              </a:defRPr>
+            </a:lvl5pPr>
+            <a:lvl6pPr marL="2514600" indent="-228600" algn="l" defTabSz="457200" rtl="0" eaLnBrk="1" latinLnBrk="0" hangingPunct="1">
+              <a:spcBef>
+                <a:spcPts val="1000"/>
+              </a:spcBef>
+              <a:spcAft>
+                <a:spcPts val="0"/>
+              </a:spcAft>
+              <a:buClr>
+                <a:schemeClr val="accent1"/>
+              </a:buClr>
+              <a:buSzPct val="80000"/>
+              <a:buFont typeface="Wingdings 3" charset="2"/>
+              <a:buChar char=""/>
+              <a:defRPr sz="1200" kern="1200">
+                <a:solidFill>
+                  <a:schemeClr val="tx1">
+                    <a:lumMod val="75000"/>
+                    <a:lumOff val="25000"/>
+                  </a:schemeClr>
+                </a:solidFill>
+                <a:latin typeface="+mn-lt"/>
+                <a:ea typeface="+mn-ea"/>
+                <a:cs typeface="+mn-cs"/>
+              </a:defRPr>
+            </a:lvl6pPr>
+            <a:lvl7pPr marL="2971800" indent="-228600" algn="l" defTabSz="457200" rtl="0" eaLnBrk="1" latinLnBrk="0" hangingPunct="1">
+              <a:spcBef>
+                <a:spcPts val="1000"/>
+              </a:spcBef>
+              <a:spcAft>
+                <a:spcPts val="0"/>
+              </a:spcAft>
+              <a:buClr>
+                <a:schemeClr val="accent1"/>
+              </a:buClr>
+              <a:buSzPct val="80000"/>
+              <a:buFont typeface="Wingdings 3" charset="2"/>
+              <a:buChar char=""/>
+              <a:defRPr sz="1200" kern="1200">
+                <a:solidFill>
+                  <a:schemeClr val="tx1">
+                    <a:lumMod val="75000"/>
+                    <a:lumOff val="25000"/>
+                  </a:schemeClr>
+                </a:solidFill>
+                <a:latin typeface="+mn-lt"/>
+                <a:ea typeface="+mn-ea"/>
+                <a:cs typeface="+mn-cs"/>
+              </a:defRPr>
+            </a:lvl7pPr>
+            <a:lvl8pPr marL="3429000" indent="-228600" algn="l" defTabSz="457200" rtl="0" eaLnBrk="1" latinLnBrk="0" hangingPunct="1">
+              <a:spcBef>
+                <a:spcPts val="1000"/>
+              </a:spcBef>
+              <a:spcAft>
+                <a:spcPts val="0"/>
+              </a:spcAft>
+              <a:buClr>
+                <a:schemeClr val="accent1"/>
+              </a:buClr>
+              <a:buSzPct val="80000"/>
+              <a:buFont typeface="Wingdings 3" charset="2"/>
+              <a:buChar char=""/>
+              <a:defRPr sz="1200" kern="1200">
+                <a:solidFill>
+                  <a:schemeClr val="tx1">
+                    <a:lumMod val="75000"/>
+                    <a:lumOff val="25000"/>
+                  </a:schemeClr>
+                </a:solidFill>
+                <a:latin typeface="+mn-lt"/>
+                <a:ea typeface="+mn-ea"/>
+                <a:cs typeface="+mn-cs"/>
+              </a:defRPr>
+            </a:lvl8pPr>
+            <a:lvl9pPr marL="3886200" indent="-228600" algn="l" defTabSz="457200" rtl="0" eaLnBrk="1" latinLnBrk="0" hangingPunct="1">
+              <a:spcBef>
+                <a:spcPts val="1000"/>
+              </a:spcBef>
+              <a:spcAft>
+                <a:spcPts val="0"/>
+              </a:spcAft>
+              <a:buClr>
+                <a:schemeClr val="accent1"/>
+              </a:buClr>
+              <a:buSzPct val="80000"/>
+              <a:buFont typeface="Wingdings 3" charset="2"/>
+              <a:buChar char=""/>
+              <a:defRPr sz="1200" kern="1200">
+                <a:solidFill>
+                  <a:schemeClr val="tx1">
+                    <a:lumMod val="75000"/>
+                    <a:lumOff val="25000"/>
+                  </a:schemeClr>
+                </a:solidFill>
+                <a:latin typeface="+mn-lt"/>
+                <a:ea typeface="+mn-ea"/>
+                <a:cs typeface="+mn-cs"/>
+              </a:defRPr>
+            </a:lvl9pPr>
+          </a:lstStyle>
+          <a:p>
+            <a:r>
+              <a:rPr lang="en-US" sz="2400" dirty="0" smtClean="0"/>
+              <a:t>Some search results return an error message stopping the program</a:t>
+            </a:r>
+          </a:p>
+          <a:p>
+            <a:r>
+              <a:rPr lang="en-US" sz="2400" dirty="0" smtClean="0"/>
+              <a:t>SQL Query to retrieve music performers stops when there are no music performers for a show. Currently the work around is to set a music performer for a performance with all fields amounting to null</a:t>
+            </a:r>
+          </a:p>
+          <a:p>
+            <a:r>
+              <a:rPr lang="en-US" sz="2400" dirty="0" smtClean="0"/>
+              <a:t>Some strings present ’odd’ symbols/characters. </a:t>
+            </a:r>
+          </a:p>
+          <a:p>
+            <a:pPr lvl="1"/>
+            <a:r>
+              <a:rPr lang="en-US" sz="2400" dirty="0" smtClean="0"/>
+              <a:t>Believe this to be a mac/windows translation problem</a:t>
+            </a:r>
+          </a:p>
+          <a:p>
+            <a:r>
+              <a:rPr lang="en-US" sz="2400" dirty="0" smtClean="0"/>
+              <a:t>Shows which have already started will still be listed in the database</a:t>
+            </a:r>
+          </a:p>
+          <a:p>
+            <a:pPr lvl="1"/>
+            <a:r>
+              <a:rPr lang="en-US" sz="2400" dirty="0" smtClean="0"/>
+              <a:t>The SQL queries need to be updated to reflect this in the program</a:t>
+            </a:r>
+          </a:p>
+          <a:p>
+            <a:pPr lvl="1"/>
+            <a:r>
+              <a:rPr lang="en-US" sz="2400" dirty="0" smtClean="0"/>
+              <a:t>For now the database must be updated each time any concert has already started</a:t>
+            </a:r>
+          </a:p>
+        </p:txBody>
+      </p:sp>
+    </p:spTree>
+    <p:extLst>
+      <p:ext uri="{BB962C8B-B14F-4D97-AF65-F5344CB8AC3E}">
+        <p14:creationId xmlns:p14="http://schemas.microsoft.com/office/powerpoint/2010/main" val="1764759779"/>
+      </p:ext>
+    </p:extLst>
+  </p:cSld>
+  <p:clrMapOvr>
+    <a:masterClrMapping/>
+  </p:clrMapOvr>
+</p:sld>
+</file>
+
+<file path=ppt/slides/slide15.xml><?xml version="1.0" encoding="utf-8"?>
+<p:sld xmlns:a="http://schemas.openxmlformats.org/drawingml/2006/main" xmlns:r="http://schemas.openxmlformats.org/officeDocument/2006/relationships" xmlns:p="http://schemas.openxmlformats.org/presentationml/2006/main">
+  <p:cSld>
+    <p:spTree>
+      <p:nvGrpSpPr>
+        <p:cNvPr id="1" name=""/>
+        <p:cNvGrpSpPr/>
+        <p:nvPr/>
+      </p:nvGrpSpPr>
+      <p:grpSpPr>
+        <a:xfrm>
+          <a:off x="0" y="0"/>
+          <a:ext cx="0" cy="0"/>
+          <a:chOff x="0" y="0"/>
+          <a:chExt cx="0" cy="0"/>
+        </a:xfrm>
+      </p:grpSpPr>
+      <p:sp>
+        <p:nvSpPr>
+          <p:cNvPr id="6" name="Title 1"/>
+          <p:cNvSpPr>
+            <a:spLocks noGrp="1"/>
+          </p:cNvSpPr>
+          <p:nvPr>
+            <p:ph type="title"/>
+          </p:nvPr>
+        </p:nvSpPr>
+        <p:spPr>
+          <a:xfrm>
+            <a:off x="677334" y="609600"/>
+            <a:ext cx="8596668" cy="1320800"/>
+          </a:xfrm>
+        </p:spPr>
+        <p:txBody>
+          <a:bodyPr/>
+          <a:lstStyle/>
+          <a:p>
+            <a:r>
+              <a:rPr lang="en-US" dirty="0" smtClean="0"/>
+              <a:t>Urgent updates needed</a:t>
             </a:r>
             <a:endParaRPr lang="en-US" dirty="0"/>
           </a:p>
@@ -10512,345 +10953,6 @@
             </a:lvl9pPr>
           </a:lstStyle>
           <a:p>
-            <a:r>
-              <a:rPr lang="en-US" sz="2800" dirty="0" smtClean="0"/>
-              <a:t>Some strings present ’odd’ symbols/characters. </a:t>
-            </a:r>
-          </a:p>
-          <a:p>
-            <a:pPr lvl="1"/>
-            <a:r>
-              <a:rPr lang="en-US" sz="2600" dirty="0" smtClean="0"/>
-              <a:t>Believe this to be a mac/windows translation problem</a:t>
-            </a:r>
-          </a:p>
-          <a:p>
-            <a:r>
-              <a:rPr lang="en-US" sz="2800" dirty="0" smtClean="0"/>
-              <a:t>Shows which have already started will still be listed in the database</a:t>
-            </a:r>
-          </a:p>
-          <a:p>
-            <a:pPr lvl="1"/>
-            <a:r>
-              <a:rPr lang="en-US" sz="2600" dirty="0" smtClean="0"/>
-              <a:t>The SQL queries need to be updated to reflect this in the program</a:t>
-            </a:r>
-          </a:p>
-          <a:p>
-            <a:pPr lvl="1"/>
-            <a:r>
-              <a:rPr lang="en-US" sz="2600" dirty="0" smtClean="0"/>
-              <a:t>For now the database must be updated each time any concert has already started</a:t>
-            </a:r>
-          </a:p>
-        </p:txBody>
-      </p:sp>
-    </p:spTree>
-    <p:extLst>
-      <p:ext uri="{BB962C8B-B14F-4D97-AF65-F5344CB8AC3E}">
-        <p14:creationId xmlns:p14="http://schemas.microsoft.com/office/powerpoint/2010/main" val="1764759779"/>
-      </p:ext>
-    </p:extLst>
-  </p:cSld>
-  <p:clrMapOvr>
-    <a:masterClrMapping/>
-  </p:clrMapOvr>
-</p:sld>
-</file>
-
-<file path=ppt/slides/slide15.xml><?xml version="1.0" encoding="utf-8"?>
-<p:sld xmlns:a="http://schemas.openxmlformats.org/drawingml/2006/main" xmlns:r="http://schemas.openxmlformats.org/officeDocument/2006/relationships" xmlns:p="http://schemas.openxmlformats.org/presentationml/2006/main">
-  <p:cSld>
-    <p:spTree>
-      <p:nvGrpSpPr>
-        <p:cNvPr id="1" name=""/>
-        <p:cNvGrpSpPr/>
-        <p:nvPr/>
-      </p:nvGrpSpPr>
-      <p:grpSpPr>
-        <a:xfrm>
-          <a:off x="0" y="0"/>
-          <a:ext cx="0" cy="0"/>
-          <a:chOff x="0" y="0"/>
-          <a:chExt cx="0" cy="0"/>
-        </a:xfrm>
-      </p:grpSpPr>
-      <p:sp>
-        <p:nvSpPr>
-          <p:cNvPr id="6" name="Title 1"/>
-          <p:cNvSpPr>
-            <a:spLocks noGrp="1"/>
-          </p:cNvSpPr>
-          <p:nvPr>
-            <p:ph type="title"/>
-          </p:nvPr>
-        </p:nvSpPr>
-        <p:spPr>
-          <a:xfrm>
-            <a:off x="677334" y="609600"/>
-            <a:ext cx="8596668" cy="1320800"/>
-          </a:xfrm>
-        </p:spPr>
-        <p:txBody>
-          <a:bodyPr/>
-          <a:lstStyle/>
-          <a:p>
-            <a:r>
-              <a:rPr lang="en-US" dirty="0" smtClean="0"/>
-              <a:t>Urgent updates needed</a:t>
-            </a:r>
-            <a:endParaRPr lang="en-US" dirty="0"/>
-          </a:p>
-        </p:txBody>
-      </p:sp>
-      <p:sp>
-        <p:nvSpPr>
-          <p:cNvPr id="3" name="Content Placeholder 2"/>
-          <p:cNvSpPr txBox="1">
-            <a:spLocks/>
-          </p:cNvSpPr>
-          <p:nvPr/>
-        </p:nvSpPr>
-        <p:spPr>
-          <a:xfrm>
-            <a:off x="304800" y="1761066"/>
-            <a:ext cx="10464800" cy="5317067"/>
-          </a:xfrm>
-          <a:prstGeom prst="rect">
-            <a:avLst/>
-          </a:prstGeom>
-        </p:spPr>
-        <p:txBody>
-          <a:bodyPr/>
-          <a:lstStyle>
-            <a:lvl1pPr marL="342900" indent="-342900" algn="l" defTabSz="457200" rtl="0" eaLnBrk="1" latinLnBrk="0" hangingPunct="1">
-              <a:spcBef>
-                <a:spcPts val="1000"/>
-              </a:spcBef>
-              <a:spcAft>
-                <a:spcPts val="0"/>
-              </a:spcAft>
-              <a:buClr>
-                <a:schemeClr val="accent1"/>
-              </a:buClr>
-              <a:buSzPct val="80000"/>
-              <a:buFont typeface="Wingdings 3" charset="2"/>
-              <a:buChar char=""/>
-              <a:defRPr sz="1800" kern="1200">
-                <a:solidFill>
-                  <a:schemeClr val="tx1">
-                    <a:lumMod val="75000"/>
-                    <a:lumOff val="25000"/>
-                  </a:schemeClr>
-                </a:solidFill>
-                <a:latin typeface="+mn-lt"/>
-                <a:ea typeface="+mn-ea"/>
-                <a:cs typeface="+mn-cs"/>
-              </a:defRPr>
-            </a:lvl1pPr>
-            <a:lvl2pPr marL="742950" indent="-285750" algn="l" defTabSz="457200" rtl="0" eaLnBrk="1" latinLnBrk="0" hangingPunct="1">
-              <a:spcBef>
-                <a:spcPts val="1000"/>
-              </a:spcBef>
-              <a:spcAft>
-                <a:spcPts val="0"/>
-              </a:spcAft>
-              <a:buClr>
-                <a:schemeClr val="accent1"/>
-              </a:buClr>
-              <a:buSzPct val="80000"/>
-              <a:buFont typeface="Wingdings 3" charset="2"/>
-              <a:buChar char=""/>
-              <a:defRPr sz="1600" kern="1200">
-                <a:solidFill>
-                  <a:schemeClr val="tx1">
-                    <a:lumMod val="75000"/>
-                    <a:lumOff val="25000"/>
-                  </a:schemeClr>
-                </a:solidFill>
-                <a:latin typeface="+mn-lt"/>
-                <a:ea typeface="+mn-ea"/>
-                <a:cs typeface="+mn-cs"/>
-              </a:defRPr>
-            </a:lvl2pPr>
-            <a:lvl3pPr marL="1143000" indent="-228600" algn="l" defTabSz="457200" rtl="0" eaLnBrk="1" latinLnBrk="0" hangingPunct="1">
-              <a:spcBef>
-                <a:spcPts val="1000"/>
-              </a:spcBef>
-              <a:spcAft>
-                <a:spcPts val="0"/>
-              </a:spcAft>
-              <a:buClr>
-                <a:schemeClr val="accent1"/>
-              </a:buClr>
-              <a:buSzPct val="80000"/>
-              <a:buFont typeface="Wingdings 3" charset="2"/>
-              <a:buChar char=""/>
-              <a:defRPr sz="1400" kern="1200">
-                <a:solidFill>
-                  <a:schemeClr val="tx1">
-                    <a:lumMod val="75000"/>
-                    <a:lumOff val="25000"/>
-                  </a:schemeClr>
-                </a:solidFill>
-                <a:latin typeface="+mn-lt"/>
-                <a:ea typeface="+mn-ea"/>
-                <a:cs typeface="+mn-cs"/>
-              </a:defRPr>
-            </a:lvl3pPr>
-            <a:lvl4pPr marL="1600200" indent="-228600" algn="l" defTabSz="457200" rtl="0" eaLnBrk="1" latinLnBrk="0" hangingPunct="1">
-              <a:spcBef>
-                <a:spcPts val="1000"/>
-              </a:spcBef>
-              <a:spcAft>
-                <a:spcPts val="0"/>
-              </a:spcAft>
-              <a:buClr>
-                <a:schemeClr val="accent1"/>
-              </a:buClr>
-              <a:buSzPct val="80000"/>
-              <a:buFont typeface="Wingdings 3" charset="2"/>
-              <a:buChar char=""/>
-              <a:defRPr sz="1200" kern="1200">
-                <a:solidFill>
-                  <a:schemeClr val="tx1">
-                    <a:lumMod val="75000"/>
-                    <a:lumOff val="25000"/>
-                  </a:schemeClr>
-                </a:solidFill>
-                <a:latin typeface="+mn-lt"/>
-                <a:ea typeface="+mn-ea"/>
-                <a:cs typeface="+mn-cs"/>
-              </a:defRPr>
-            </a:lvl4pPr>
-            <a:lvl5pPr marL="2057400" indent="-228600" algn="l" defTabSz="457200" rtl="0" eaLnBrk="1" latinLnBrk="0" hangingPunct="1">
-              <a:spcBef>
-                <a:spcPts val="1000"/>
-              </a:spcBef>
-              <a:spcAft>
-                <a:spcPts val="0"/>
-              </a:spcAft>
-              <a:buClr>
-                <a:schemeClr val="accent1"/>
-              </a:buClr>
-              <a:buSzPct val="80000"/>
-              <a:buFont typeface="Wingdings 3" charset="2"/>
-              <a:buChar char=""/>
-              <a:defRPr sz="1200" kern="1200">
-                <a:solidFill>
-                  <a:schemeClr val="tx1">
-                    <a:lumMod val="75000"/>
-                    <a:lumOff val="25000"/>
-                  </a:schemeClr>
-                </a:solidFill>
-                <a:latin typeface="+mn-lt"/>
-                <a:ea typeface="+mn-ea"/>
-                <a:cs typeface="+mn-cs"/>
-              </a:defRPr>
-            </a:lvl5pPr>
-            <a:lvl6pPr marL="2514600" indent="-228600" algn="l" defTabSz="457200" rtl="0" eaLnBrk="1" latinLnBrk="0" hangingPunct="1">
-              <a:spcBef>
-                <a:spcPts val="1000"/>
-              </a:spcBef>
-              <a:spcAft>
-                <a:spcPts val="0"/>
-              </a:spcAft>
-              <a:buClr>
-                <a:schemeClr val="accent1"/>
-              </a:buClr>
-              <a:buSzPct val="80000"/>
-              <a:buFont typeface="Wingdings 3" charset="2"/>
-              <a:buChar char=""/>
-              <a:defRPr sz="1200" kern="1200">
-                <a:solidFill>
-                  <a:schemeClr val="tx1">
-                    <a:lumMod val="75000"/>
-                    <a:lumOff val="25000"/>
-                  </a:schemeClr>
-                </a:solidFill>
-                <a:latin typeface="+mn-lt"/>
-                <a:ea typeface="+mn-ea"/>
-                <a:cs typeface="+mn-cs"/>
-              </a:defRPr>
-            </a:lvl6pPr>
-            <a:lvl7pPr marL="2971800" indent="-228600" algn="l" defTabSz="457200" rtl="0" eaLnBrk="1" latinLnBrk="0" hangingPunct="1">
-              <a:spcBef>
-                <a:spcPts val="1000"/>
-              </a:spcBef>
-              <a:spcAft>
-                <a:spcPts val="0"/>
-              </a:spcAft>
-              <a:buClr>
-                <a:schemeClr val="accent1"/>
-              </a:buClr>
-              <a:buSzPct val="80000"/>
-              <a:buFont typeface="Wingdings 3" charset="2"/>
-              <a:buChar char=""/>
-              <a:defRPr sz="1200" kern="1200">
-                <a:solidFill>
-                  <a:schemeClr val="tx1">
-                    <a:lumMod val="75000"/>
-                    <a:lumOff val="25000"/>
-                  </a:schemeClr>
-                </a:solidFill>
-                <a:latin typeface="+mn-lt"/>
-                <a:ea typeface="+mn-ea"/>
-                <a:cs typeface="+mn-cs"/>
-              </a:defRPr>
-            </a:lvl7pPr>
-            <a:lvl8pPr marL="3429000" indent="-228600" algn="l" defTabSz="457200" rtl="0" eaLnBrk="1" latinLnBrk="0" hangingPunct="1">
-              <a:spcBef>
-                <a:spcPts val="1000"/>
-              </a:spcBef>
-              <a:spcAft>
-                <a:spcPts val="0"/>
-              </a:spcAft>
-              <a:buClr>
-                <a:schemeClr val="accent1"/>
-              </a:buClr>
-              <a:buSzPct val="80000"/>
-              <a:buFont typeface="Wingdings 3" charset="2"/>
-              <a:buChar char=""/>
-              <a:defRPr sz="1200" kern="1200">
-                <a:solidFill>
-                  <a:schemeClr val="tx1">
-                    <a:lumMod val="75000"/>
-                    <a:lumOff val="25000"/>
-                  </a:schemeClr>
-                </a:solidFill>
-                <a:latin typeface="+mn-lt"/>
-                <a:ea typeface="+mn-ea"/>
-                <a:cs typeface="+mn-cs"/>
-              </a:defRPr>
-            </a:lvl8pPr>
-            <a:lvl9pPr marL="3886200" indent="-228600" algn="l" defTabSz="457200" rtl="0" eaLnBrk="1" latinLnBrk="0" hangingPunct="1">
-              <a:spcBef>
-                <a:spcPts val="1000"/>
-              </a:spcBef>
-              <a:spcAft>
-                <a:spcPts val="0"/>
-              </a:spcAft>
-              <a:buClr>
-                <a:schemeClr val="accent1"/>
-              </a:buClr>
-              <a:buSzPct val="80000"/>
-              <a:buFont typeface="Wingdings 3" charset="2"/>
-              <a:buChar char=""/>
-              <a:defRPr sz="1200" kern="1200">
-                <a:solidFill>
-                  <a:schemeClr val="tx1">
-                    <a:lumMod val="75000"/>
-                    <a:lumOff val="25000"/>
-                  </a:schemeClr>
-                </a:solidFill>
-                <a:latin typeface="+mn-lt"/>
-                <a:ea typeface="+mn-ea"/>
-                <a:cs typeface="+mn-cs"/>
-              </a:defRPr>
-            </a:lvl9pPr>
-          </a:lstStyle>
-          <a:p>
             <a:pPr lvl="1"/>
             <a:endParaRPr lang="en-US" sz="2600" dirty="0" smtClean="0"/>
           </a:p>
@@ -11105,13 +11207,27 @@
           <a:p>
             <a:r>
               <a:rPr lang="en-US" sz="2800" dirty="0" smtClean="0"/>
-              <a:t>Updating the SQL queries to only show concerts that have not yet started</a:t>
+              <a:t>Update the search function account for all possible user inputs</a:t>
             </a:r>
           </a:p>
           <a:p>
             <a:r>
               <a:rPr lang="en-US" sz="2800" dirty="0" smtClean="0"/>
-              <a:t>Fix the ‘odd’ character/symbols bugs</a:t>
+              <a:t>Updating the SQL queries to </a:t>
+            </a:r>
+            <a:r>
+              <a:rPr lang="en-US" sz="2800" smtClean="0"/>
+              <a:t>account for bugs</a:t>
+            </a:r>
+          </a:p>
+          <a:p>
+            <a:r>
+              <a:rPr lang="en-US" sz="2800" smtClean="0"/>
+              <a:t>Fix </a:t>
+            </a:r>
+            <a:r>
+              <a:rPr lang="en-US" sz="2800" dirty="0" smtClean="0"/>
+              <a:t>the ‘odd’ character/symbols bugs</a:t>
             </a:r>
           </a:p>
         </p:txBody>
@@ -11480,13 +11596,8 @@
           <a:p>
             <a:r>
               <a:rPr lang="en-US" sz="2000" dirty="0" smtClean="0"/>
-              <a:t>A GUI to make the User </a:t>
-            </a:r>
-            <a:r>
-              <a:rPr lang="en-US" sz="2000" smtClean="0"/>
-              <a:t>experience nicer</a:t>
-            </a:r>
-            <a:endParaRPr lang="en-US" sz="2000" dirty="0" smtClean="0"/>
+              <a:t>A GUI to make the User experience nicer</a:t>
+            </a:r>
           </a:p>
         </p:txBody>
       </p:sp>

</xml_diff>